<commit_message>
reactiveX: work on the presentation and some materials
</commit_message>
<xml_diff>
--- a/reactiveX/reactiveX.pptx
+++ b/reactiveX/reactiveX.pptx
@@ -5,30 +5,29 @@
     <p:sldMasterId id="2147483839" r:id="rId1"/>
   </p:sldMasterIdLst>
   <p:sldIdLst>
-    <p:sldId id="256" r:id="rId2"/>
-    <p:sldId id="257" r:id="rId3"/>
-    <p:sldId id="258" r:id="rId4"/>
-    <p:sldId id="259" r:id="rId5"/>
-    <p:sldId id="260" r:id="rId6"/>
-    <p:sldId id="261" r:id="rId7"/>
-    <p:sldId id="262" r:id="rId8"/>
-    <p:sldId id="263" r:id="rId9"/>
-    <p:sldId id="264" r:id="rId10"/>
-    <p:sldId id="265" r:id="rId11"/>
-    <p:sldId id="266" r:id="rId12"/>
-    <p:sldId id="267" r:id="rId13"/>
-    <p:sldId id="268" r:id="rId14"/>
-    <p:sldId id="269" r:id="rId15"/>
-    <p:sldId id="270" r:id="rId16"/>
-    <p:sldId id="271" r:id="rId17"/>
-    <p:sldId id="272" r:id="rId18"/>
-    <p:sldId id="273" r:id="rId19"/>
-    <p:sldId id="274" r:id="rId20"/>
-    <p:sldId id="275" r:id="rId21"/>
-    <p:sldId id="276" r:id="rId22"/>
-    <p:sldId id="277" r:id="rId23"/>
-    <p:sldId id="278" r:id="rId24"/>
-    <p:sldId id="279" r:id="rId25"/>
+    <p:sldId id="257" r:id="rId2"/>
+    <p:sldId id="256" r:id="rId3"/>
+    <p:sldId id="280" r:id="rId4"/>
+    <p:sldId id="281" r:id="rId5"/>
+    <p:sldId id="294" r:id="rId6"/>
+    <p:sldId id="295" r:id="rId7"/>
+    <p:sldId id="297" r:id="rId8"/>
+    <p:sldId id="298" r:id="rId9"/>
+    <p:sldId id="299" r:id="rId10"/>
+    <p:sldId id="300" r:id="rId11"/>
+    <p:sldId id="301" r:id="rId12"/>
+    <p:sldId id="283" r:id="rId13"/>
+    <p:sldId id="282" r:id="rId14"/>
+    <p:sldId id="285" r:id="rId15"/>
+    <p:sldId id="286" r:id="rId16"/>
+    <p:sldId id="284" r:id="rId17"/>
+    <p:sldId id="287" r:id="rId18"/>
+    <p:sldId id="288" r:id="rId19"/>
+    <p:sldId id="289" r:id="rId20"/>
+    <p:sldId id="290" r:id="rId21"/>
+    <p:sldId id="291" r:id="rId22"/>
+    <p:sldId id="293" r:id="rId23"/>
+    <p:sldId id="292" r:id="rId24"/>
   </p:sldIdLst>
   <p:sldSz cx="12192000" cy="6858000"/>
   <p:notesSz cx="6858000" cy="9144000"/>
@@ -128,6 +127,41 @@
     </a:lvl9pPr>
   </p:defaultTextStyle>
   <p:extLst>
+    <p:ext uri="{521415D9-36F7-43E2-AB2F-B90AF26B5E84}">
+      <p14:sectionLst xmlns:p14="http://schemas.microsoft.com/office/powerpoint/2010/main">
+        <p14:section name="Default Section" id="{FDD9EA3D-6ACB-45F1-97C1-AB4E629B1B81}">
+          <p14:sldIdLst>
+            <p14:sldId id="257"/>
+            <p14:sldId id="256"/>
+          </p14:sldIdLst>
+        </p14:section>
+        <p14:section name="Untitled Section" id="{411C4A5F-E7B4-4D31-88E2-3434CB803A71}">
+          <p14:sldIdLst>
+            <p14:sldId id="280"/>
+            <p14:sldId id="281"/>
+            <p14:sldId id="294"/>
+            <p14:sldId id="295"/>
+            <p14:sldId id="297"/>
+            <p14:sldId id="298"/>
+            <p14:sldId id="299"/>
+            <p14:sldId id="300"/>
+            <p14:sldId id="301"/>
+            <p14:sldId id="283"/>
+            <p14:sldId id="282"/>
+            <p14:sldId id="285"/>
+            <p14:sldId id="286"/>
+            <p14:sldId id="284"/>
+            <p14:sldId id="287"/>
+            <p14:sldId id="288"/>
+            <p14:sldId id="289"/>
+            <p14:sldId id="290"/>
+            <p14:sldId id="291"/>
+            <p14:sldId id="293"/>
+            <p14:sldId id="292"/>
+          </p14:sldIdLst>
+        </p14:section>
+      </p14:sectionLst>
+    </p:ext>
     <p:ext uri="{EFAFB233-063F-42B5-8137-9DF3F51BA10A}">
       <p15:sldGuideLst xmlns:p15="http://schemas.microsoft.com/office/powerpoint/2012/main"/>
     </p:ext>
@@ -643,7 +677,7 @@
           <a:p>
             <a:fld id="{B9995F3C-CABB-4599-A081-9F420B0EF6A4}" type="datetimeFigureOut">
               <a:rPr lang="en-US" smtClean="0"/>
-              <a:t>10/6/2019</a:t>
+              <a:t>10/30/2019</a:t>
             </a:fld>
             <a:endParaRPr lang="en-US"/>
           </a:p>
@@ -1625,7 +1659,7 @@
           <a:p>
             <a:fld id="{B9995F3C-CABB-4599-A081-9F420B0EF6A4}" type="datetimeFigureOut">
               <a:rPr lang="en-US" smtClean="0"/>
-              <a:t>10/6/2019</a:t>
+              <a:t>10/30/2019</a:t>
             </a:fld>
             <a:endParaRPr lang="en-US"/>
           </a:p>
@@ -2495,7 +2529,7 @@
           <a:p>
             <a:fld id="{B9995F3C-CABB-4599-A081-9F420B0EF6A4}" type="datetimeFigureOut">
               <a:rPr lang="en-US" smtClean="0"/>
-              <a:t>10/6/2019</a:t>
+              <a:t>10/30/2019</a:t>
             </a:fld>
             <a:endParaRPr lang="en-US"/>
           </a:p>
@@ -3516,7 +3550,7 @@
           <a:p>
             <a:fld id="{B9995F3C-CABB-4599-A081-9F420B0EF6A4}" type="datetimeFigureOut">
               <a:rPr lang="en-US" smtClean="0"/>
-              <a:t>10/6/2019</a:t>
+              <a:t>10/30/2019</a:t>
             </a:fld>
             <a:endParaRPr lang="en-US"/>
           </a:p>
@@ -4436,7 +4470,7 @@
           <a:p>
             <a:fld id="{B9995F3C-CABB-4599-A081-9F420B0EF6A4}" type="datetimeFigureOut">
               <a:rPr lang="en-US" smtClean="0"/>
-              <a:t>10/6/2019</a:t>
+              <a:t>10/30/2019</a:t>
             </a:fld>
             <a:endParaRPr lang="en-US"/>
           </a:p>
@@ -5092,7 +5126,7 @@
           <a:p>
             <a:fld id="{B9995F3C-CABB-4599-A081-9F420B0EF6A4}" type="datetimeFigureOut">
               <a:rPr lang="en-US" smtClean="0"/>
-              <a:t>10/6/2019</a:t>
+              <a:t>10/30/2019</a:t>
             </a:fld>
             <a:endParaRPr lang="en-US"/>
           </a:p>
@@ -5949,7 +5983,7 @@
           <a:p>
             <a:fld id="{B9995F3C-CABB-4599-A081-9F420B0EF6A4}" type="datetimeFigureOut">
               <a:rPr lang="en-US" smtClean="0"/>
-              <a:t>10/6/2019</a:t>
+              <a:t>10/30/2019</a:t>
             </a:fld>
             <a:endParaRPr lang="en-US"/>
           </a:p>
@@ -6132,7 +6166,7 @@
           <a:p>
             <a:fld id="{B9995F3C-CABB-4599-A081-9F420B0EF6A4}" type="datetimeFigureOut">
               <a:rPr lang="en-US" smtClean="0"/>
-              <a:t>10/6/2019</a:t>
+              <a:t>10/30/2019</a:t>
             </a:fld>
             <a:endParaRPr lang="en-US"/>
           </a:p>
@@ -6989,7 +7023,7 @@
           <a:p>
             <a:fld id="{B9995F3C-CABB-4599-A081-9F420B0EF6A4}" type="datetimeFigureOut">
               <a:rPr lang="en-US" smtClean="0"/>
-              <a:t>10/6/2019</a:t>
+              <a:t>10/30/2019</a:t>
             </a:fld>
             <a:endParaRPr lang="en-US"/>
           </a:p>
@@ -7208,7 +7242,7 @@
           <a:p>
             <a:fld id="{B9995F3C-CABB-4599-A081-9F420B0EF6A4}" type="datetimeFigureOut">
               <a:rPr lang="en-US" smtClean="0"/>
-              <a:t>10/6/2019</a:t>
+              <a:t>10/30/2019</a:t>
             </a:fld>
             <a:endParaRPr lang="en-US"/>
           </a:p>
@@ -8133,7 +8167,7 @@
           <a:p>
             <a:fld id="{B9995F3C-CABB-4599-A081-9F420B0EF6A4}" type="datetimeFigureOut">
               <a:rPr lang="en-US" smtClean="0"/>
-              <a:t>10/6/2019</a:t>
+              <a:t>10/30/2019</a:t>
             </a:fld>
             <a:endParaRPr lang="en-US"/>
           </a:p>
@@ -8417,7 +8451,7 @@
           <a:p>
             <a:fld id="{B9995F3C-CABB-4599-A081-9F420B0EF6A4}" type="datetimeFigureOut">
               <a:rPr lang="en-US" smtClean="0"/>
-              <a:t>10/6/2019</a:t>
+              <a:t>10/30/2019</a:t>
             </a:fld>
             <a:endParaRPr lang="en-US"/>
           </a:p>
@@ -8807,7 +8841,7 @@
           <a:p>
             <a:fld id="{B9995F3C-CABB-4599-A081-9F420B0EF6A4}" type="datetimeFigureOut">
               <a:rPr lang="en-US" smtClean="0"/>
-              <a:t>10/6/2019</a:t>
+              <a:t>10/30/2019</a:t>
             </a:fld>
             <a:endParaRPr lang="en-US"/>
           </a:p>
@@ -8933,7 +8967,7 @@
           <a:p>
             <a:fld id="{B9995F3C-CABB-4599-A081-9F420B0EF6A4}" type="datetimeFigureOut">
               <a:rPr lang="en-US" smtClean="0"/>
-              <a:t>10/6/2019</a:t>
+              <a:t>10/30/2019</a:t>
             </a:fld>
             <a:endParaRPr lang="en-US"/>
           </a:p>
@@ -9028,7 +9062,7 @@
           <a:p>
             <a:fld id="{B9995F3C-CABB-4599-A081-9F420B0EF6A4}" type="datetimeFigureOut">
               <a:rPr lang="en-US" smtClean="0"/>
-              <a:t>10/6/2019</a:t>
+              <a:t>10/30/2019</a:t>
             </a:fld>
             <a:endParaRPr lang="en-US"/>
           </a:p>
@@ -9999,7 +10033,7 @@
           <a:p>
             <a:fld id="{B9995F3C-CABB-4599-A081-9F420B0EF6A4}" type="datetimeFigureOut">
               <a:rPr lang="en-US" smtClean="0"/>
-              <a:t>10/6/2019</a:t>
+              <a:t>10/30/2019</a:t>
             </a:fld>
             <a:endParaRPr lang="en-US"/>
           </a:p>
@@ -10994,7 +11028,7 @@
           <a:p>
             <a:fld id="{B9995F3C-CABB-4599-A081-9F420B0EF6A4}" type="datetimeFigureOut">
               <a:rPr lang="en-US" smtClean="0"/>
-              <a:t>10/6/2019</a:t>
+              <a:t>10/30/2019</a:t>
             </a:fld>
             <a:endParaRPr lang="en-US"/>
           </a:p>
@@ -11878,7 +11912,7 @@
           <a:p>
             <a:fld id="{B9995F3C-CABB-4599-A081-9F420B0EF6A4}" type="datetimeFigureOut">
               <a:rPr lang="en-US" smtClean="0"/>
-              <a:t>10/6/2019</a:t>
+              <a:t>10/30/2019</a:t>
             </a:fld>
             <a:endParaRPr lang="en-US"/>
           </a:p>
@@ -12465,7 +12499,7 @@
           <a:p>
             <a:r>
               <a:rPr lang="en-US" dirty="0" err="1"/>
-              <a:t>ReactiveX</a:t>
+              <a:t>xxxx</a:t>
             </a:r>
             <a:endParaRPr lang="en-US" dirty="0"/>
           </a:p>
@@ -12493,16 +12527,53 @@
           <a:lstStyle/>
           <a:p>
             <a:r>
-              <a:rPr lang="en-US" dirty="0"/>
-              <a:t>What is it?</a:t>
+              <a:rPr lang="en-US" dirty="0" err="1"/>
+              <a:t>Xxxx</a:t>
             </a:r>
-          </a:p>
-        </p:txBody>
-      </p:sp>
+            <a:endParaRPr lang="en-US" dirty="0"/>
+          </a:p>
+        </p:txBody>
+      </p:sp>
+      <p:pic>
+        <p:nvPicPr>
+          <p:cNvPr id="5" name="Picture 4">
+            <a:extLst>
+              <a:ext uri="{FF2B5EF4-FFF2-40B4-BE49-F238E27FC236}">
+                <a16:creationId xmlns:a16="http://schemas.microsoft.com/office/drawing/2014/main" id="{9228C1CF-9260-4DE4-9B15-064017F49905}"/>
+              </a:ext>
+            </a:extLst>
+          </p:cNvPr>
+          <p:cNvPicPr>
+            <a:picLocks noChangeAspect="1"/>
+          </p:cNvPicPr>
+          <p:nvPr/>
+        </p:nvPicPr>
+        <p:blipFill>
+          <a:blip r:embed="rId2">
+            <a:extLst>
+              <a:ext uri="{28A0092B-C50C-407E-A947-70E740481C1C}">
+                <a14:useLocalDpi xmlns:a14="http://schemas.microsoft.com/office/drawing/2010/main" val="0"/>
+              </a:ext>
+            </a:extLst>
+          </a:blip>
+          <a:stretch>
+            <a:fillRect/>
+          </a:stretch>
+        </p:blipFill>
+        <p:spPr>
+          <a:xfrm>
+            <a:off x="0" y="-419381"/>
+            <a:ext cx="12192000" cy="8128000"/>
+          </a:xfrm>
+          <a:prstGeom prst="rect">
+            <a:avLst/>
+          </a:prstGeom>
+        </p:spPr>
+      </p:pic>
     </p:spTree>
     <p:extLst>
       <p:ext uri="{BB962C8B-B14F-4D97-AF65-F5344CB8AC3E}">
-        <p14:creationId xmlns:p14="http://schemas.microsoft.com/office/powerpoint/2010/main" val="1665975282"/>
+        <p14:creationId xmlns:p14="http://schemas.microsoft.com/office/powerpoint/2010/main" val="127464578"/>
       </p:ext>
     </p:extLst>
   </p:cSld>
@@ -12547,8 +12618,8 @@
         </p:nvSpPr>
         <p:spPr>
           <a:xfrm>
-            <a:off x="1154955" y="1015741"/>
-            <a:ext cx="8825658" cy="813055"/>
+            <a:off x="1154955" y="776494"/>
+            <a:ext cx="8825658" cy="713639"/>
           </a:xfrm>
         </p:spPr>
         <p:txBody>
@@ -12556,10 +12627,10 @@
           <a:lstStyle/>
           <a:p>
             <a:r>
-              <a:rPr lang="en-US" dirty="0" err="1"/>
-              <a:t>xxxx</a:t>
+              <a:rPr lang="ru-RU" sz="4400" dirty="0"/>
+              <a:t>Откуда ноги ростут?</a:t>
             </a:r>
-            <a:endParaRPr lang="en-US" dirty="0"/>
+            <a:endParaRPr lang="en-US" sz="4400" dirty="0"/>
           </a:p>
         </p:txBody>
       </p:sp>
@@ -12579,15 +12650,29 @@
             <p:ph type="subTitle" idx="1"/>
           </p:nvPr>
         </p:nvSpPr>
-        <p:spPr/>
+        <p:spPr>
+          <a:xfrm>
+            <a:off x="1154955" y="2861733"/>
+            <a:ext cx="8825658" cy="2777067"/>
+          </a:xfrm>
+        </p:spPr>
         <p:txBody>
           <a:bodyPr/>
           <a:lstStyle/>
           <a:p>
             <a:r>
-              <a:rPr lang="en-US" dirty="0" err="1"/>
-              <a:t>Xxxx</a:t>
+              <a:rPr lang="ru-RU" dirty="0"/>
+              <a:t>От </a:t>
             </a:r>
+            <a:r>
+              <a:rPr lang="en-US" dirty="0"/>
+              <a:t>… Microsoft</a:t>
+            </a:r>
+          </a:p>
+          <a:p>
+            <a:endParaRPr lang="ru-RU" dirty="0"/>
+          </a:p>
+          <a:p>
             <a:endParaRPr lang="en-US" dirty="0"/>
           </a:p>
         </p:txBody>
@@ -12595,7 +12680,7 @@
     </p:spTree>
     <p:extLst>
       <p:ext uri="{BB962C8B-B14F-4D97-AF65-F5344CB8AC3E}">
-        <p14:creationId xmlns:p14="http://schemas.microsoft.com/office/powerpoint/2010/main" val="2964089186"/>
+        <p14:creationId xmlns:p14="http://schemas.microsoft.com/office/powerpoint/2010/main" val="2297988432"/>
       </p:ext>
     </p:extLst>
   </p:cSld>
@@ -12640,8 +12725,8 @@
         </p:nvSpPr>
         <p:spPr>
           <a:xfrm>
-            <a:off x="1154955" y="1015741"/>
-            <a:ext cx="8825658" cy="813055"/>
+            <a:off x="1154955" y="776494"/>
+            <a:ext cx="8825658" cy="713639"/>
           </a:xfrm>
         </p:spPr>
         <p:txBody>
@@ -12649,10 +12734,10 @@
           <a:lstStyle/>
           <a:p>
             <a:r>
-              <a:rPr lang="en-US" dirty="0" err="1"/>
-              <a:t>xxxx</a:t>
+              <a:rPr lang="ru-RU" sz="4400" dirty="0"/>
+              <a:t>Откуда ноги ростут?</a:t>
             </a:r>
-            <a:endParaRPr lang="en-US" dirty="0"/>
+            <a:endParaRPr lang="en-US" sz="4400" dirty="0"/>
           </a:p>
         </p:txBody>
       </p:sp>
@@ -12672,15 +12757,45 @@
             <p:ph type="subTitle" idx="1"/>
           </p:nvPr>
         </p:nvSpPr>
-        <p:spPr/>
+        <p:spPr>
+          <a:xfrm>
+            <a:off x="1154955" y="2861733"/>
+            <a:ext cx="8825658" cy="2777067"/>
+          </a:xfrm>
+        </p:spPr>
         <p:txBody>
           <a:bodyPr/>
           <a:lstStyle/>
           <a:p>
             <a:r>
-              <a:rPr lang="en-US" dirty="0" err="1"/>
-              <a:t>Xxxx</a:t>
+              <a:rPr lang="ru-RU" dirty="0"/>
+              <a:t>От </a:t>
             </a:r>
+            <a:r>
+              <a:rPr lang="en-US" dirty="0"/>
+              <a:t>… Microsoft</a:t>
+            </a:r>
+          </a:p>
+          <a:p>
+            <a:r>
+              <a:rPr lang="ru-RU" dirty="0"/>
+              <a:t>А именно эрик мейер. </a:t>
+            </a:r>
+          </a:p>
+          <a:p>
+            <a:r>
+              <a:rPr lang="ru-RU" dirty="0"/>
+              <a:t>Он же занимался созданием </a:t>
+            </a:r>
+            <a:r>
+              <a:rPr lang="en-US" dirty="0"/>
+              <a:t>LINQ.</a:t>
+            </a:r>
+          </a:p>
+          <a:p>
+            <a:endParaRPr lang="ru-RU" dirty="0"/>
+          </a:p>
+          <a:p>
             <a:endParaRPr lang="en-US" dirty="0"/>
           </a:p>
         </p:txBody>
@@ -12688,7 +12803,7 @@
     </p:spTree>
     <p:extLst>
       <p:ext uri="{BB962C8B-B14F-4D97-AF65-F5344CB8AC3E}">
-        <p14:creationId xmlns:p14="http://schemas.microsoft.com/office/powerpoint/2010/main" val="2048476642"/>
+        <p14:creationId xmlns:p14="http://schemas.microsoft.com/office/powerpoint/2010/main" val="1767948898"/>
       </p:ext>
     </p:extLst>
   </p:cSld>
@@ -12733,8 +12848,8 @@
         </p:nvSpPr>
         <p:spPr>
           <a:xfrm>
-            <a:off x="1154955" y="1015741"/>
-            <a:ext cx="8825658" cy="813055"/>
+            <a:off x="1154955" y="776494"/>
+            <a:ext cx="8825658" cy="713639"/>
           </a:xfrm>
         </p:spPr>
         <p:txBody>
@@ -12742,10 +12857,10 @@
           <a:lstStyle/>
           <a:p>
             <a:r>
-              <a:rPr lang="en-US" dirty="0" err="1"/>
-              <a:t>xxxx</a:t>
+              <a:rPr lang="ru-RU" sz="4400" dirty="0"/>
+              <a:t>Что такое push и pull модели? </a:t>
             </a:r>
-            <a:endParaRPr lang="en-US" dirty="0"/>
+            <a:endParaRPr lang="en-US" sz="4400" dirty="0"/>
           </a:p>
         </p:txBody>
       </p:sp>
@@ -12765,15 +12880,16 @@
             <p:ph type="subTitle" idx="1"/>
           </p:nvPr>
         </p:nvSpPr>
-        <p:spPr/>
+        <p:spPr>
+          <a:xfrm>
+            <a:off x="1154955" y="2861733"/>
+            <a:ext cx="8825658" cy="2777067"/>
+          </a:xfrm>
+        </p:spPr>
         <p:txBody>
           <a:bodyPr/>
           <a:lstStyle/>
           <a:p>
-            <a:r>
-              <a:rPr lang="en-US" dirty="0" err="1"/>
-              <a:t>Xxxx</a:t>
-            </a:r>
             <a:endParaRPr lang="en-US" dirty="0"/>
           </a:p>
         </p:txBody>
@@ -12781,7 +12897,7 @@
     </p:spTree>
     <p:extLst>
       <p:ext uri="{BB962C8B-B14F-4D97-AF65-F5344CB8AC3E}">
-        <p14:creationId xmlns:p14="http://schemas.microsoft.com/office/powerpoint/2010/main" val="2774226602"/>
+        <p14:creationId xmlns:p14="http://schemas.microsoft.com/office/powerpoint/2010/main" val="2798364437"/>
       </p:ext>
     </p:extLst>
   </p:cSld>
@@ -12826,8 +12942,8 @@
         </p:nvSpPr>
         <p:spPr>
           <a:xfrm>
-            <a:off x="1154955" y="1015741"/>
-            <a:ext cx="8825658" cy="813055"/>
+            <a:off x="1154955" y="776494"/>
+            <a:ext cx="8825658" cy="713639"/>
           </a:xfrm>
         </p:spPr>
         <p:txBody>
@@ -12835,10 +12951,22 @@
           <a:lstStyle/>
           <a:p>
             <a:r>
-              <a:rPr lang="en-US" dirty="0" err="1"/>
-              <a:t>xxxx</a:t>
+              <a:rPr lang="en-US" sz="4400" dirty="0" err="1"/>
+              <a:t>IEnumerable</a:t>
             </a:r>
-            <a:endParaRPr lang="en-US" dirty="0"/>
+            <a:r>
+              <a:rPr lang="en-US" sz="4400" dirty="0"/>
+              <a:t> vs </a:t>
+            </a:r>
+            <a:r>
+              <a:rPr lang="en-US" sz="4400" dirty="0" err="1"/>
+              <a:t>IObservable</a:t>
+            </a:r>
+            <a:r>
+              <a:rPr lang="ru-RU" sz="4400" dirty="0"/>
+              <a:t>?</a:t>
+            </a:r>
+            <a:endParaRPr lang="en-US" sz="4400" dirty="0"/>
           </a:p>
         </p:txBody>
       </p:sp>
@@ -12858,15 +12986,16 @@
             <p:ph type="subTitle" idx="1"/>
           </p:nvPr>
         </p:nvSpPr>
-        <p:spPr/>
+        <p:spPr>
+          <a:xfrm>
+            <a:off x="1154955" y="2861733"/>
+            <a:ext cx="8825658" cy="2777067"/>
+          </a:xfrm>
+        </p:spPr>
         <p:txBody>
           <a:bodyPr/>
           <a:lstStyle/>
           <a:p>
-            <a:r>
-              <a:rPr lang="en-US" dirty="0" err="1"/>
-              <a:t>Xxxx</a:t>
-            </a:r>
             <a:endParaRPr lang="en-US" dirty="0"/>
           </a:p>
         </p:txBody>
@@ -12874,7 +13003,7 @@
     </p:spTree>
     <p:extLst>
       <p:ext uri="{BB962C8B-B14F-4D97-AF65-F5344CB8AC3E}">
-        <p14:creationId xmlns:p14="http://schemas.microsoft.com/office/powerpoint/2010/main" val="3372484619"/>
+        <p14:creationId xmlns:p14="http://schemas.microsoft.com/office/powerpoint/2010/main" val="1985818148"/>
       </p:ext>
     </p:extLst>
   </p:cSld>
@@ -12919,8 +13048,8 @@
         </p:nvSpPr>
         <p:spPr>
           <a:xfrm>
-            <a:off x="1154955" y="1015741"/>
-            <a:ext cx="8825658" cy="813055"/>
+            <a:off x="1154955" y="776494"/>
+            <a:ext cx="8825658" cy="713639"/>
           </a:xfrm>
         </p:spPr>
         <p:txBody>
@@ -12928,10 +13057,10 @@
           <a:lstStyle/>
           <a:p>
             <a:r>
-              <a:rPr lang="en-US" dirty="0" err="1"/>
-              <a:t>xxxx</a:t>
+              <a:rPr lang="ru-RU" sz="4400" dirty="0"/>
+              <a:t>Что такое паттерн Итератор?</a:t>
             </a:r>
-            <a:endParaRPr lang="en-US" dirty="0"/>
+            <a:endParaRPr lang="en-US" sz="4400" dirty="0"/>
           </a:p>
         </p:txBody>
       </p:sp>
@@ -12951,15 +13080,16 @@
             <p:ph type="subTitle" idx="1"/>
           </p:nvPr>
         </p:nvSpPr>
-        <p:spPr/>
+        <p:spPr>
+          <a:xfrm>
+            <a:off x="1154955" y="2861733"/>
+            <a:ext cx="8825658" cy="2777067"/>
+          </a:xfrm>
+        </p:spPr>
         <p:txBody>
           <a:bodyPr/>
           <a:lstStyle/>
           <a:p>
-            <a:r>
-              <a:rPr lang="en-US" dirty="0" err="1"/>
-              <a:t>Xxxx</a:t>
-            </a:r>
             <a:endParaRPr lang="en-US" dirty="0"/>
           </a:p>
         </p:txBody>
@@ -12967,7 +13097,7 @@
     </p:spTree>
     <p:extLst>
       <p:ext uri="{BB962C8B-B14F-4D97-AF65-F5344CB8AC3E}">
-        <p14:creationId xmlns:p14="http://schemas.microsoft.com/office/powerpoint/2010/main" val="4170283881"/>
+        <p14:creationId xmlns:p14="http://schemas.microsoft.com/office/powerpoint/2010/main" val="2414369664"/>
       </p:ext>
     </p:extLst>
   </p:cSld>
@@ -13012,8 +13142,8 @@
         </p:nvSpPr>
         <p:spPr>
           <a:xfrm>
-            <a:off x="1154955" y="1015741"/>
-            <a:ext cx="8825658" cy="813055"/>
+            <a:off x="1154955" y="776494"/>
+            <a:ext cx="8825658" cy="1365573"/>
           </a:xfrm>
         </p:spPr>
         <p:txBody>
@@ -13021,10 +13151,10 @@
           <a:lstStyle/>
           <a:p>
             <a:r>
-              <a:rPr lang="en-US" dirty="0" err="1"/>
-              <a:t>xxxx</a:t>
+              <a:rPr lang="ru-RU" sz="4400" dirty="0"/>
+              <a:t>Что такое паттерн Наблюдатель?</a:t>
             </a:r>
-            <a:endParaRPr lang="en-US" dirty="0"/>
+            <a:endParaRPr lang="en-US" sz="4400" dirty="0"/>
           </a:p>
         </p:txBody>
       </p:sp>
@@ -13044,15 +13174,16 @@
             <p:ph type="subTitle" idx="1"/>
           </p:nvPr>
         </p:nvSpPr>
-        <p:spPr/>
+        <p:spPr>
+          <a:xfrm>
+            <a:off x="1154955" y="2861733"/>
+            <a:ext cx="8825658" cy="2777067"/>
+          </a:xfrm>
+        </p:spPr>
         <p:txBody>
           <a:bodyPr/>
           <a:lstStyle/>
           <a:p>
-            <a:r>
-              <a:rPr lang="en-US" dirty="0" err="1"/>
-              <a:t>Xxxx</a:t>
-            </a:r>
             <a:endParaRPr lang="en-US" dirty="0"/>
           </a:p>
         </p:txBody>
@@ -13060,7 +13191,7 @@
     </p:spTree>
     <p:extLst>
       <p:ext uri="{BB962C8B-B14F-4D97-AF65-F5344CB8AC3E}">
-        <p14:creationId xmlns:p14="http://schemas.microsoft.com/office/powerpoint/2010/main" val="2236909099"/>
+        <p14:creationId xmlns:p14="http://schemas.microsoft.com/office/powerpoint/2010/main" val="2634787251"/>
       </p:ext>
     </p:extLst>
   </p:cSld>
@@ -13105,8 +13236,8 @@
         </p:nvSpPr>
         <p:spPr>
           <a:xfrm>
-            <a:off x="1154955" y="1015741"/>
-            <a:ext cx="8825658" cy="813055"/>
+            <a:off x="1154955" y="776494"/>
+            <a:ext cx="8825658" cy="713639"/>
           </a:xfrm>
         </p:spPr>
         <p:txBody>
@@ -13114,10 +13245,9 @@
           <a:lstStyle/>
           <a:p>
             <a:r>
-              <a:rPr lang="en-US" dirty="0" err="1"/>
-              <a:t>xxxx</a:t>
+              <a:rPr lang="en-US" sz="4400" dirty="0"/>
+              <a:t>Rx Pattern</a:t>
             </a:r>
-            <a:endParaRPr lang="en-US" dirty="0"/>
           </a:p>
         </p:txBody>
       </p:sp>
@@ -13137,23 +13267,27 @@
             <p:ph type="subTitle" idx="1"/>
           </p:nvPr>
         </p:nvSpPr>
-        <p:spPr/>
+        <p:spPr>
+          <a:xfrm>
+            <a:off x="1154955" y="2861733"/>
+            <a:ext cx="8825658" cy="2777067"/>
+          </a:xfrm>
+        </p:spPr>
         <p:txBody>
           <a:bodyPr/>
           <a:lstStyle/>
           <a:p>
             <a:r>
-              <a:rPr lang="en-US" dirty="0" err="1"/>
-              <a:t>Xxxx</a:t>
+              <a:rPr lang="en-US" dirty="0"/>
+              <a:t>RX Pattern = Observer Pattern + Iterator Pattern</a:t>
             </a:r>
-            <a:endParaRPr lang="en-US" dirty="0"/>
           </a:p>
         </p:txBody>
       </p:sp>
     </p:spTree>
     <p:extLst>
       <p:ext uri="{BB962C8B-B14F-4D97-AF65-F5344CB8AC3E}">
-        <p14:creationId xmlns:p14="http://schemas.microsoft.com/office/powerpoint/2010/main" val="2012573812"/>
+        <p14:creationId xmlns:p14="http://schemas.microsoft.com/office/powerpoint/2010/main" val="1623221828"/>
       </p:ext>
     </p:extLst>
   </p:cSld>
@@ -13198,8 +13332,8 @@
         </p:nvSpPr>
         <p:spPr>
           <a:xfrm>
-            <a:off x="1154955" y="1015741"/>
-            <a:ext cx="8825658" cy="813055"/>
+            <a:off x="1154955" y="776494"/>
+            <a:ext cx="9199778" cy="713639"/>
           </a:xfrm>
         </p:spPr>
         <p:txBody>
@@ -13207,10 +13341,10 @@
           <a:lstStyle/>
           <a:p>
             <a:r>
-              <a:rPr lang="en-US" dirty="0" err="1"/>
-              <a:t>xxxx</a:t>
+              <a:rPr lang="ru-RU" sz="4400" dirty="0"/>
+              <a:t>Что такое событийная модель?</a:t>
             </a:r>
-            <a:endParaRPr lang="en-US" dirty="0"/>
+            <a:endParaRPr lang="en-US" sz="4400" dirty="0"/>
           </a:p>
         </p:txBody>
       </p:sp>
@@ -13230,15 +13364,16 @@
             <p:ph type="subTitle" idx="1"/>
           </p:nvPr>
         </p:nvSpPr>
-        <p:spPr/>
+        <p:spPr>
+          <a:xfrm>
+            <a:off x="1154955" y="2861733"/>
+            <a:ext cx="8825658" cy="2777067"/>
+          </a:xfrm>
+        </p:spPr>
         <p:txBody>
           <a:bodyPr/>
           <a:lstStyle/>
           <a:p>
-            <a:r>
-              <a:rPr lang="en-US" dirty="0" err="1"/>
-              <a:t>Xxxx</a:t>
-            </a:r>
             <a:endParaRPr lang="en-US" dirty="0"/>
           </a:p>
         </p:txBody>
@@ -13246,7 +13381,7 @@
     </p:spTree>
     <p:extLst>
       <p:ext uri="{BB962C8B-B14F-4D97-AF65-F5344CB8AC3E}">
-        <p14:creationId xmlns:p14="http://schemas.microsoft.com/office/powerpoint/2010/main" val="3639585234"/>
+        <p14:creationId xmlns:p14="http://schemas.microsoft.com/office/powerpoint/2010/main" val="944779534"/>
       </p:ext>
     </p:extLst>
   </p:cSld>
@@ -13291,8 +13426,8 @@
         </p:nvSpPr>
         <p:spPr>
           <a:xfrm>
-            <a:off x="1154955" y="1015741"/>
-            <a:ext cx="8825658" cy="813055"/>
+            <a:off x="1154954" y="776494"/>
+            <a:ext cx="9157445" cy="1983639"/>
           </a:xfrm>
         </p:spPr>
         <p:txBody>
@@ -13300,10 +13435,10 @@
           <a:lstStyle/>
           <a:p>
             <a:r>
-              <a:rPr lang="en-US" dirty="0" err="1"/>
-              <a:t>xxxx</a:t>
+              <a:rPr lang="ru-RU" sz="4400" dirty="0"/>
+              <a:t>Какие преимущества предоставляет нам Реактивные расширения?</a:t>
             </a:r>
-            <a:endParaRPr lang="en-US" dirty="0"/>
+            <a:endParaRPr lang="en-US" sz="4400" dirty="0"/>
           </a:p>
         </p:txBody>
       </p:sp>
@@ -13323,15 +13458,16 @@
             <p:ph type="subTitle" idx="1"/>
           </p:nvPr>
         </p:nvSpPr>
-        <p:spPr/>
+        <p:spPr>
+          <a:xfrm>
+            <a:off x="1154955" y="2861733"/>
+            <a:ext cx="8825658" cy="2777067"/>
+          </a:xfrm>
+        </p:spPr>
         <p:txBody>
           <a:bodyPr/>
           <a:lstStyle/>
           <a:p>
-            <a:r>
-              <a:rPr lang="en-US" dirty="0" err="1"/>
-              <a:t>Xxxx</a:t>
-            </a:r>
             <a:endParaRPr lang="en-US" dirty="0"/>
           </a:p>
         </p:txBody>
@@ -13339,7 +13475,7 @@
     </p:spTree>
     <p:extLst>
       <p:ext uri="{BB962C8B-B14F-4D97-AF65-F5344CB8AC3E}">
-        <p14:creationId xmlns:p14="http://schemas.microsoft.com/office/powerpoint/2010/main" val="2033582996"/>
+        <p14:creationId xmlns:p14="http://schemas.microsoft.com/office/powerpoint/2010/main" val="2106926076"/>
       </p:ext>
     </p:extLst>
   </p:cSld>
@@ -13384,8 +13520,8 @@
         </p:nvSpPr>
         <p:spPr>
           <a:xfrm>
-            <a:off x="1154955" y="1015741"/>
-            <a:ext cx="8825658" cy="813055"/>
+            <a:off x="1154955" y="776494"/>
+            <a:ext cx="9199778" cy="713639"/>
           </a:xfrm>
         </p:spPr>
         <p:txBody>
@@ -13393,10 +13529,13 @@
           <a:lstStyle/>
           <a:p>
             <a:r>
-              <a:rPr lang="en-US" dirty="0" err="1"/>
-              <a:t>xxxx</a:t>
+              <a:rPr lang="ru-RU" sz="4400" dirty="0"/>
+              <a:t>Что такое </a:t>
             </a:r>
-            <a:endParaRPr lang="en-US" dirty="0"/>
+            <a:r>
+              <a:rPr lang="en-US" sz="4400" dirty="0"/>
+              <a:t>Cold Observable?</a:t>
+            </a:r>
           </a:p>
         </p:txBody>
       </p:sp>
@@ -13416,15 +13555,16 @@
             <p:ph type="subTitle" idx="1"/>
           </p:nvPr>
         </p:nvSpPr>
-        <p:spPr/>
+        <p:spPr>
+          <a:xfrm>
+            <a:off x="1154955" y="2861733"/>
+            <a:ext cx="8825658" cy="2777067"/>
+          </a:xfrm>
+        </p:spPr>
         <p:txBody>
           <a:bodyPr/>
           <a:lstStyle/>
           <a:p>
-            <a:r>
-              <a:rPr lang="en-US" dirty="0" err="1"/>
-              <a:t>Xxxx</a:t>
-            </a:r>
             <a:endParaRPr lang="en-US" dirty="0"/>
           </a:p>
         </p:txBody>
@@ -13432,7 +13572,7 @@
     </p:spTree>
     <p:extLst>
       <p:ext uri="{BB962C8B-B14F-4D97-AF65-F5344CB8AC3E}">
-        <p14:creationId xmlns:p14="http://schemas.microsoft.com/office/powerpoint/2010/main" val="1244952400"/>
+        <p14:creationId xmlns:p14="http://schemas.microsoft.com/office/powerpoint/2010/main" val="1213369216"/>
       </p:ext>
     </p:extLst>
   </p:cSld>
@@ -13477,8 +13617,8 @@
         </p:nvSpPr>
         <p:spPr>
           <a:xfrm>
-            <a:off x="1154955" y="1015741"/>
-            <a:ext cx="8825658" cy="813055"/>
+            <a:off x="3378381" y="3022472"/>
+            <a:ext cx="4378806" cy="813055"/>
           </a:xfrm>
         </p:spPr>
         <p:txBody>
@@ -13486,10 +13626,22 @@
           <a:lstStyle/>
           <a:p>
             <a:r>
-              <a:rPr lang="en-US" dirty="0" err="1"/>
-              <a:t>xxxx</a:t>
+              <a:rPr lang="en-US" sz="6600" dirty="0" err="1"/>
+              <a:t>Reactive</a:t>
             </a:r>
-            <a:endParaRPr lang="en-US" dirty="0"/>
+            <a:r>
+              <a:rPr lang="en-US" sz="6600" dirty="0" err="1">
+                <a:solidFill>
+                  <a:srgbClr val="B01513"/>
+                </a:solidFill>
+              </a:rPr>
+              <a:t>X</a:t>
+            </a:r>
+            <a:endParaRPr lang="en-US" sz="6600" dirty="0">
+              <a:solidFill>
+                <a:srgbClr val="B01513"/>
+              </a:solidFill>
+            </a:endParaRPr>
           </a:p>
         </p:txBody>
       </p:sp>
@@ -13514,10 +13666,6 @@
           <a:bodyPr/>
           <a:lstStyle/>
           <a:p>
-            <a:r>
-              <a:rPr lang="en-US" dirty="0" err="1"/>
-              <a:t>Xxxx</a:t>
-            </a:r>
             <a:endParaRPr lang="en-US" dirty="0"/>
           </a:p>
         </p:txBody>
@@ -13525,7 +13673,7 @@
     </p:spTree>
     <p:extLst>
       <p:ext uri="{BB962C8B-B14F-4D97-AF65-F5344CB8AC3E}">
-        <p14:creationId xmlns:p14="http://schemas.microsoft.com/office/powerpoint/2010/main" val="127464578"/>
+        <p14:creationId xmlns:p14="http://schemas.microsoft.com/office/powerpoint/2010/main" val="1665975282"/>
       </p:ext>
     </p:extLst>
   </p:cSld>
@@ -13570,8 +13718,8 @@
         </p:nvSpPr>
         <p:spPr>
           <a:xfrm>
-            <a:off x="1154955" y="1015741"/>
-            <a:ext cx="8825658" cy="813055"/>
+            <a:off x="1154955" y="776494"/>
+            <a:ext cx="9199778" cy="713639"/>
           </a:xfrm>
         </p:spPr>
         <p:txBody>
@@ -13579,10 +13727,13 @@
           <a:lstStyle/>
           <a:p>
             <a:r>
-              <a:rPr lang="en-US" dirty="0" err="1"/>
-              <a:t>xxxx</a:t>
+              <a:rPr lang="ru-RU" sz="4400" dirty="0"/>
+              <a:t>Что такое </a:t>
             </a:r>
-            <a:endParaRPr lang="en-US" dirty="0"/>
+            <a:r>
+              <a:rPr lang="en-US" sz="4400" dirty="0"/>
+              <a:t>Hot Observable?</a:t>
+            </a:r>
           </a:p>
         </p:txBody>
       </p:sp>
@@ -13602,15 +13753,16 @@
             <p:ph type="subTitle" idx="1"/>
           </p:nvPr>
         </p:nvSpPr>
-        <p:spPr/>
+        <p:spPr>
+          <a:xfrm>
+            <a:off x="1154955" y="2861733"/>
+            <a:ext cx="8825658" cy="2777067"/>
+          </a:xfrm>
+        </p:spPr>
         <p:txBody>
           <a:bodyPr/>
           <a:lstStyle/>
           <a:p>
-            <a:r>
-              <a:rPr lang="en-US" dirty="0" err="1"/>
-              <a:t>Xxxx</a:t>
-            </a:r>
             <a:endParaRPr lang="en-US" dirty="0"/>
           </a:p>
         </p:txBody>
@@ -13618,7 +13770,7 @@
     </p:spTree>
     <p:extLst>
       <p:ext uri="{BB962C8B-B14F-4D97-AF65-F5344CB8AC3E}">
-        <p14:creationId xmlns:p14="http://schemas.microsoft.com/office/powerpoint/2010/main" val="2755868545"/>
+        <p14:creationId xmlns:p14="http://schemas.microsoft.com/office/powerpoint/2010/main" val="781665626"/>
       </p:ext>
     </p:extLst>
   </p:cSld>
@@ -13663,8 +13815,8 @@
         </p:nvSpPr>
         <p:spPr>
           <a:xfrm>
-            <a:off x="1154955" y="1015741"/>
-            <a:ext cx="8825658" cy="813055"/>
+            <a:off x="1154955" y="776494"/>
+            <a:ext cx="9199778" cy="713639"/>
           </a:xfrm>
         </p:spPr>
         <p:txBody>
@@ -13672,10 +13824,10 @@
           <a:lstStyle/>
           <a:p>
             <a:r>
-              <a:rPr lang="en-US" dirty="0" err="1"/>
-              <a:t>xxxx</a:t>
+              <a:rPr lang="ru-RU" sz="4400" dirty="0"/>
+              <a:t>Что такое акторная модель?</a:t>
             </a:r>
-            <a:endParaRPr lang="en-US" dirty="0"/>
+            <a:endParaRPr lang="en-US" sz="4400" dirty="0"/>
           </a:p>
         </p:txBody>
       </p:sp>
@@ -13695,15 +13847,16 @@
             <p:ph type="subTitle" idx="1"/>
           </p:nvPr>
         </p:nvSpPr>
-        <p:spPr/>
+        <p:spPr>
+          <a:xfrm>
+            <a:off x="1154955" y="2861733"/>
+            <a:ext cx="8825658" cy="2777067"/>
+          </a:xfrm>
+        </p:spPr>
         <p:txBody>
           <a:bodyPr/>
           <a:lstStyle/>
           <a:p>
-            <a:r>
-              <a:rPr lang="en-US" dirty="0" err="1"/>
-              <a:t>Xxxx</a:t>
-            </a:r>
             <a:endParaRPr lang="en-US" dirty="0"/>
           </a:p>
         </p:txBody>
@@ -13711,7 +13864,7 @@
     </p:spTree>
     <p:extLst>
       <p:ext uri="{BB962C8B-B14F-4D97-AF65-F5344CB8AC3E}">
-        <p14:creationId xmlns:p14="http://schemas.microsoft.com/office/powerpoint/2010/main" val="3255016551"/>
+        <p14:creationId xmlns:p14="http://schemas.microsoft.com/office/powerpoint/2010/main" val="8395898"/>
       </p:ext>
     </p:extLst>
   </p:cSld>
@@ -13756,8 +13909,8 @@
         </p:nvSpPr>
         <p:spPr>
           <a:xfrm>
-            <a:off x="1154955" y="1015741"/>
-            <a:ext cx="8825658" cy="813055"/>
+            <a:off x="1154955" y="776494"/>
+            <a:ext cx="9199778" cy="713639"/>
           </a:xfrm>
         </p:spPr>
         <p:txBody>
@@ -13765,10 +13918,10 @@
           <a:lstStyle/>
           <a:p>
             <a:r>
-              <a:rPr lang="en-US" dirty="0" err="1"/>
-              <a:t>xxxx</a:t>
+              <a:rPr lang="ru-RU" sz="4400" dirty="0"/>
+              <a:t>Что такое событийная модель?</a:t>
             </a:r>
-            <a:endParaRPr lang="en-US" dirty="0"/>
+            <a:endParaRPr lang="en-US" sz="4400" dirty="0"/>
           </a:p>
         </p:txBody>
       </p:sp>
@@ -13788,15 +13941,16 @@
             <p:ph type="subTitle" idx="1"/>
           </p:nvPr>
         </p:nvSpPr>
-        <p:spPr/>
+        <p:spPr>
+          <a:xfrm>
+            <a:off x="1154955" y="2861733"/>
+            <a:ext cx="8825658" cy="2777067"/>
+          </a:xfrm>
+        </p:spPr>
         <p:txBody>
           <a:bodyPr/>
           <a:lstStyle/>
           <a:p>
-            <a:r>
-              <a:rPr lang="en-US" dirty="0" err="1"/>
-              <a:t>Xxxx</a:t>
-            </a:r>
             <a:endParaRPr lang="en-US" dirty="0"/>
           </a:p>
         </p:txBody>
@@ -13804,7 +13958,7 @@
     </p:spTree>
     <p:extLst>
       <p:ext uri="{BB962C8B-B14F-4D97-AF65-F5344CB8AC3E}">
-        <p14:creationId xmlns:p14="http://schemas.microsoft.com/office/powerpoint/2010/main" val="3032621037"/>
+        <p14:creationId xmlns:p14="http://schemas.microsoft.com/office/powerpoint/2010/main" val="751961821"/>
       </p:ext>
     </p:extLst>
   </p:cSld>
@@ -13849,8 +14003,8 @@
         </p:nvSpPr>
         <p:spPr>
           <a:xfrm>
-            <a:off x="1154955" y="1015741"/>
-            <a:ext cx="8825658" cy="813055"/>
+            <a:off x="1154955" y="776494"/>
+            <a:ext cx="9199778" cy="713639"/>
           </a:xfrm>
         </p:spPr>
         <p:txBody>
@@ -13858,10 +14012,10 @@
           <a:lstStyle/>
           <a:p>
             <a:r>
-              <a:rPr lang="en-US" dirty="0" err="1"/>
-              <a:t>xxxx</a:t>
+              <a:rPr lang="ru-RU" sz="4400" dirty="0"/>
+              <a:t>Хайп?</a:t>
             </a:r>
-            <a:endParaRPr lang="en-US" dirty="0"/>
+            <a:endParaRPr lang="en-US" sz="4400" dirty="0"/>
           </a:p>
         </p:txBody>
       </p:sp>
@@ -13881,14 +14035,19 @@
             <p:ph type="subTitle" idx="1"/>
           </p:nvPr>
         </p:nvSpPr>
-        <p:spPr/>
+        <p:spPr>
+          <a:xfrm>
+            <a:off x="1154955" y="2861733"/>
+            <a:ext cx="8825658" cy="2777067"/>
+          </a:xfrm>
+        </p:spPr>
         <p:txBody>
           <a:bodyPr/>
           <a:lstStyle/>
           <a:p>
             <a:r>
-              <a:rPr lang="en-US" dirty="0" err="1"/>
-              <a:t>Xxxx</a:t>
+              <a:rPr lang="ru-RU" dirty="0"/>
+              <a:t>Почему последнее время Реативные расширения становятся столь популярны?</a:t>
             </a:r>
             <a:endParaRPr lang="en-US" dirty="0"/>
           </a:p>
@@ -13897,100 +14056,7 @@
     </p:spTree>
     <p:extLst>
       <p:ext uri="{BB962C8B-B14F-4D97-AF65-F5344CB8AC3E}">
-        <p14:creationId xmlns:p14="http://schemas.microsoft.com/office/powerpoint/2010/main" val="3280875806"/>
-      </p:ext>
-    </p:extLst>
-  </p:cSld>
-  <p:clrMapOvr>
-    <a:masterClrMapping/>
-  </p:clrMapOvr>
-</p:sld>
-</file>
-
-<file path=ppt/slides/slide24.xml><?xml version="1.0" encoding="utf-8"?>
-<p:sld xmlns:a="http://schemas.openxmlformats.org/drawingml/2006/main" xmlns:r="http://schemas.openxmlformats.org/officeDocument/2006/relationships" xmlns:p="http://schemas.openxmlformats.org/presentationml/2006/main">
-  <p:cSld>
-    <p:spTree>
-      <p:nvGrpSpPr>
-        <p:cNvPr id="1" name=""/>
-        <p:cNvGrpSpPr/>
-        <p:nvPr/>
-      </p:nvGrpSpPr>
-      <p:grpSpPr>
-        <a:xfrm>
-          <a:off x="0" y="0"/>
-          <a:ext cx="0" cy="0"/>
-          <a:chOff x="0" y="0"/>
-          <a:chExt cx="0" cy="0"/>
-        </a:xfrm>
-      </p:grpSpPr>
-      <p:sp>
-        <p:nvSpPr>
-          <p:cNvPr id="2" name="Title 1">
-            <a:extLst>
-              <a:ext uri="{FF2B5EF4-FFF2-40B4-BE49-F238E27FC236}">
-                <a16:creationId xmlns:a16="http://schemas.microsoft.com/office/drawing/2014/main" id="{F8ADAE79-72C3-4128-BC87-DBC5B059028E}"/>
-              </a:ext>
-            </a:extLst>
-          </p:cNvPr>
-          <p:cNvSpPr>
-            <a:spLocks noGrp="1"/>
-          </p:cNvSpPr>
-          <p:nvPr>
-            <p:ph type="ctrTitle"/>
-          </p:nvPr>
-        </p:nvSpPr>
-        <p:spPr>
-          <a:xfrm>
-            <a:off x="1154955" y="1015741"/>
-            <a:ext cx="8825658" cy="813055"/>
-          </a:xfrm>
-        </p:spPr>
-        <p:txBody>
-          <a:bodyPr/>
-          <a:lstStyle/>
-          <a:p>
-            <a:r>
-              <a:rPr lang="en-US" dirty="0" err="1"/>
-              <a:t>xxxx</a:t>
-            </a:r>
-            <a:endParaRPr lang="en-US" dirty="0"/>
-          </a:p>
-        </p:txBody>
-      </p:sp>
-      <p:sp>
-        <p:nvSpPr>
-          <p:cNvPr id="3" name="Subtitle 2">
-            <a:extLst>
-              <a:ext uri="{FF2B5EF4-FFF2-40B4-BE49-F238E27FC236}">
-                <a16:creationId xmlns:a16="http://schemas.microsoft.com/office/drawing/2014/main" id="{60C395F4-B5A3-4F2F-855A-0006FCE96DD0}"/>
-              </a:ext>
-            </a:extLst>
-          </p:cNvPr>
-          <p:cNvSpPr>
-            <a:spLocks noGrp="1"/>
-          </p:cNvSpPr>
-          <p:nvPr>
-            <p:ph type="subTitle" idx="1"/>
-          </p:nvPr>
-        </p:nvSpPr>
-        <p:spPr/>
-        <p:txBody>
-          <a:bodyPr/>
-          <a:lstStyle/>
-          <a:p>
-            <a:r>
-              <a:rPr lang="en-US" dirty="0" err="1"/>
-              <a:t>Xxxx</a:t>
-            </a:r>
-            <a:endParaRPr lang="en-US" dirty="0"/>
-          </a:p>
-        </p:txBody>
-      </p:sp>
-    </p:spTree>
-    <p:extLst>
-      <p:ext uri="{BB962C8B-B14F-4D97-AF65-F5344CB8AC3E}">
-        <p14:creationId xmlns:p14="http://schemas.microsoft.com/office/powerpoint/2010/main" val="3050970319"/>
+        <p14:creationId xmlns:p14="http://schemas.microsoft.com/office/powerpoint/2010/main" val="64754934"/>
       </p:ext>
     </p:extLst>
   </p:cSld>
@@ -14035,8 +14101,8 @@
         </p:nvSpPr>
         <p:spPr>
           <a:xfrm>
-            <a:off x="1154955" y="1015741"/>
-            <a:ext cx="8825658" cy="813055"/>
+            <a:off x="1154955" y="776494"/>
+            <a:ext cx="8825658" cy="713639"/>
           </a:xfrm>
         </p:spPr>
         <p:txBody>
@@ -14044,10 +14110,22 @@
           <a:lstStyle/>
           <a:p>
             <a:r>
-              <a:rPr lang="en-US" dirty="0" err="1"/>
-              <a:t>xxxx</a:t>
+              <a:rPr lang="ru-RU" sz="4400" dirty="0"/>
+              <a:t>Что такое </a:t>
             </a:r>
-            <a:endParaRPr lang="en-US" dirty="0"/>
+            <a:r>
+              <a:rPr lang="en-US" sz="4400" dirty="0"/>
+              <a:t>Reactive </a:t>
+            </a:r>
+            <a:r>
+              <a:rPr lang="en-US" sz="4400" dirty="0" err="1"/>
+              <a:t>Extentions</a:t>
+            </a:r>
+            <a:r>
+              <a:rPr lang="ru-RU" sz="4400" dirty="0"/>
+              <a:t>?</a:t>
+            </a:r>
+            <a:endParaRPr lang="en-US" sz="4400" dirty="0"/>
           </a:p>
         </p:txBody>
       </p:sp>
@@ -14067,15 +14145,16 @@
             <p:ph type="subTitle" idx="1"/>
           </p:nvPr>
         </p:nvSpPr>
-        <p:spPr/>
+        <p:spPr>
+          <a:xfrm>
+            <a:off x="1154955" y="2861733"/>
+            <a:ext cx="8825658" cy="2777067"/>
+          </a:xfrm>
+        </p:spPr>
         <p:txBody>
           <a:bodyPr/>
           <a:lstStyle/>
           <a:p>
-            <a:r>
-              <a:rPr lang="en-US" dirty="0" err="1"/>
-              <a:t>Xxxx</a:t>
-            </a:r>
             <a:endParaRPr lang="en-US" dirty="0"/>
           </a:p>
         </p:txBody>
@@ -14083,7 +14162,7 @@
     </p:spTree>
     <p:extLst>
       <p:ext uri="{BB962C8B-B14F-4D97-AF65-F5344CB8AC3E}">
-        <p14:creationId xmlns:p14="http://schemas.microsoft.com/office/powerpoint/2010/main" val="1755803221"/>
+        <p14:creationId xmlns:p14="http://schemas.microsoft.com/office/powerpoint/2010/main" val="4190111287"/>
       </p:ext>
     </p:extLst>
   </p:cSld>
@@ -14128,8 +14207,8 @@
         </p:nvSpPr>
         <p:spPr>
           <a:xfrm>
-            <a:off x="1154955" y="1015741"/>
-            <a:ext cx="8825658" cy="813055"/>
+            <a:off x="1154955" y="776494"/>
+            <a:ext cx="8825658" cy="1314773"/>
           </a:xfrm>
         </p:spPr>
         <p:txBody>
@@ -14137,10 +14216,10 @@
           <a:lstStyle/>
           <a:p>
             <a:r>
-              <a:rPr lang="en-US" dirty="0" err="1"/>
-              <a:t>xxxx</a:t>
+              <a:rPr lang="ru-RU" sz="4400" dirty="0"/>
+              <a:t>Какие причины возникновения этой библиотеки?</a:t>
             </a:r>
-            <a:endParaRPr lang="en-US" dirty="0"/>
+            <a:endParaRPr lang="en-US" sz="4400" dirty="0"/>
           </a:p>
         </p:txBody>
       </p:sp>
@@ -14160,15 +14239,16 @@
             <p:ph type="subTitle" idx="1"/>
           </p:nvPr>
         </p:nvSpPr>
-        <p:spPr/>
+        <p:spPr>
+          <a:xfrm>
+            <a:off x="1154955" y="2861733"/>
+            <a:ext cx="8825658" cy="2777067"/>
+          </a:xfrm>
+        </p:spPr>
         <p:txBody>
           <a:bodyPr/>
           <a:lstStyle/>
           <a:p>
-            <a:r>
-              <a:rPr lang="en-US" dirty="0" err="1"/>
-              <a:t>Xxxx</a:t>
-            </a:r>
             <a:endParaRPr lang="en-US" dirty="0"/>
           </a:p>
         </p:txBody>
@@ -14176,7 +14256,7 @@
     </p:spTree>
     <p:extLst>
       <p:ext uri="{BB962C8B-B14F-4D97-AF65-F5344CB8AC3E}">
-        <p14:creationId xmlns:p14="http://schemas.microsoft.com/office/powerpoint/2010/main" val="2313042533"/>
+        <p14:creationId xmlns:p14="http://schemas.microsoft.com/office/powerpoint/2010/main" val="3514693486"/>
       </p:ext>
     </p:extLst>
   </p:cSld>
@@ -14221,8 +14301,8 @@
         </p:nvSpPr>
         <p:spPr>
           <a:xfrm>
-            <a:off x="1154955" y="1015741"/>
-            <a:ext cx="8825658" cy="813055"/>
+            <a:off x="1154955" y="776494"/>
+            <a:ext cx="8825658" cy="713639"/>
           </a:xfrm>
         </p:spPr>
         <p:txBody>
@@ -14230,10 +14310,10 @@
           <a:lstStyle/>
           <a:p>
             <a:r>
-              <a:rPr lang="en-US" dirty="0" err="1"/>
-              <a:t>xxxx</a:t>
+              <a:rPr lang="ru-RU" sz="4400" dirty="0"/>
+              <a:t>Что нового?</a:t>
             </a:r>
-            <a:endParaRPr lang="en-US" dirty="0"/>
+            <a:endParaRPr lang="en-US" sz="4400" dirty="0"/>
           </a:p>
         </p:txBody>
       </p:sp>
@@ -14253,15 +14333,16 @@
             <p:ph type="subTitle" idx="1"/>
           </p:nvPr>
         </p:nvSpPr>
-        <p:spPr/>
+        <p:spPr>
+          <a:xfrm>
+            <a:off x="1154955" y="2861733"/>
+            <a:ext cx="8825658" cy="2777067"/>
+          </a:xfrm>
+        </p:spPr>
         <p:txBody>
           <a:bodyPr/>
           <a:lstStyle/>
           <a:p>
-            <a:r>
-              <a:rPr lang="en-US" dirty="0" err="1"/>
-              <a:t>Xxxx</a:t>
-            </a:r>
             <a:endParaRPr lang="en-US" dirty="0"/>
           </a:p>
         </p:txBody>
@@ -14269,7 +14350,7 @@
     </p:spTree>
     <p:extLst>
       <p:ext uri="{BB962C8B-B14F-4D97-AF65-F5344CB8AC3E}">
-        <p14:creationId xmlns:p14="http://schemas.microsoft.com/office/powerpoint/2010/main" val="1185885521"/>
+        <p14:creationId xmlns:p14="http://schemas.microsoft.com/office/powerpoint/2010/main" val="4035409235"/>
       </p:ext>
     </p:extLst>
   </p:cSld>
@@ -14314,8 +14395,8 @@
         </p:nvSpPr>
         <p:spPr>
           <a:xfrm>
-            <a:off x="1154955" y="1015741"/>
-            <a:ext cx="8825658" cy="813055"/>
+            <a:off x="1154955" y="776494"/>
+            <a:ext cx="8825658" cy="713639"/>
           </a:xfrm>
         </p:spPr>
         <p:txBody>
@@ -14323,10 +14404,10 @@
           <a:lstStyle/>
           <a:p>
             <a:r>
-              <a:rPr lang="en-US" dirty="0" err="1"/>
-              <a:t>xxxx</a:t>
+              <a:rPr lang="ru-RU" sz="4400" dirty="0"/>
+              <a:t>Что нового?</a:t>
             </a:r>
-            <a:endParaRPr lang="en-US" dirty="0"/>
+            <a:endParaRPr lang="en-US" sz="4400" dirty="0"/>
           </a:p>
         </p:txBody>
       </p:sp>
@@ -14346,23 +14427,33 @@
             <p:ph type="subTitle" idx="1"/>
           </p:nvPr>
         </p:nvSpPr>
-        <p:spPr/>
-        <p:txBody>
-          <a:bodyPr/>
+        <p:spPr>
+          <a:xfrm>
+            <a:off x="1154955" y="2861733"/>
+            <a:ext cx="8825658" cy="2777067"/>
+          </a:xfrm>
+        </p:spPr>
+        <p:txBody>
+          <a:bodyPr>
+            <a:normAutofit/>
+          </a:bodyPr>
           <a:lstStyle/>
           <a:p>
             <a:r>
-              <a:rPr lang="en-US" dirty="0" err="1"/>
-              <a:t>Xxxx</a:t>
+              <a:rPr lang="ru-RU" sz="2400" dirty="0"/>
+              <a:t>Ничего</a:t>
             </a:r>
-            <a:endParaRPr lang="en-US" dirty="0"/>
+            <a:r>
+              <a:rPr lang="en-US" sz="2400" dirty="0"/>
+              <a:t> …</a:t>
+            </a:r>
           </a:p>
         </p:txBody>
       </p:sp>
     </p:spTree>
     <p:extLst>
       <p:ext uri="{BB962C8B-B14F-4D97-AF65-F5344CB8AC3E}">
-        <p14:creationId xmlns:p14="http://schemas.microsoft.com/office/powerpoint/2010/main" val="3509179791"/>
+        <p14:creationId xmlns:p14="http://schemas.microsoft.com/office/powerpoint/2010/main" val="2639351724"/>
       </p:ext>
     </p:extLst>
   </p:cSld>
@@ -14407,8 +14498,8 @@
         </p:nvSpPr>
         <p:spPr>
           <a:xfrm>
-            <a:off x="1154955" y="1015741"/>
-            <a:ext cx="8825658" cy="813055"/>
+            <a:off x="1154955" y="776494"/>
+            <a:ext cx="8825658" cy="713639"/>
           </a:xfrm>
         </p:spPr>
         <p:txBody>
@@ -14416,10 +14507,10 @@
           <a:lstStyle/>
           <a:p>
             <a:r>
-              <a:rPr lang="en-US" dirty="0" err="1"/>
-              <a:t>xxxx</a:t>
+              <a:rPr lang="ru-RU" sz="4400" dirty="0"/>
+              <a:t>Что нового?</a:t>
             </a:r>
-            <a:endParaRPr lang="en-US" dirty="0"/>
+            <a:endParaRPr lang="en-US" sz="4400" dirty="0"/>
           </a:p>
         </p:txBody>
       </p:sp>
@@ -14439,23 +14530,72 @@
             <p:ph type="subTitle" idx="1"/>
           </p:nvPr>
         </p:nvSpPr>
-        <p:spPr/>
+        <p:spPr>
+          <a:xfrm>
+            <a:off x="1154955" y="2861733"/>
+            <a:ext cx="8825658" cy="2777067"/>
+          </a:xfrm>
+        </p:spPr>
         <p:txBody>
           <a:bodyPr/>
           <a:lstStyle/>
           <a:p>
             <a:r>
-              <a:rPr lang="en-US" dirty="0" err="1"/>
-              <a:t>Xxxx</a:t>
+              <a:rPr lang="ru-RU" sz="2400" dirty="0"/>
+              <a:t>Ничего</a:t>
             </a:r>
-            <a:endParaRPr lang="en-US" dirty="0"/>
+            <a:r>
+              <a:rPr lang="en-US" sz="2400" dirty="0"/>
+              <a:t> …</a:t>
+            </a:r>
+            <a:endParaRPr lang="ru-RU" sz="2400" dirty="0"/>
+          </a:p>
+          <a:p>
+            <a:pPr marL="285750" indent="-285750">
+              <a:buFont typeface="Arial" panose="020B0604020202020204" pitchFamily="34" charset="0"/>
+              <a:buChar char="•"/>
+            </a:pPr>
+            <a:r>
+              <a:rPr lang="ru-RU" b="1" dirty="0"/>
+              <a:t>За всем что меняется можно наблюдать и реагировать</a:t>
+            </a:r>
+          </a:p>
+          <a:p>
+            <a:pPr marL="285750" indent="-285750">
+              <a:buFont typeface="Arial" panose="020B0604020202020204" pitchFamily="34" charset="0"/>
+              <a:buChar char="•"/>
+            </a:pPr>
+            <a:r>
+              <a:rPr lang="en-US" b="1" dirty="0"/>
+              <a:t>Observable</a:t>
+            </a:r>
+          </a:p>
+          <a:p>
+            <a:pPr marL="285750" indent="-285750">
+              <a:buFont typeface="Arial" panose="020B0604020202020204" pitchFamily="34" charset="0"/>
+              <a:buChar char="•"/>
+            </a:pPr>
+            <a:r>
+              <a:rPr lang="en-US" b="1" dirty="0"/>
+              <a:t>Event == Observable</a:t>
+            </a:r>
+          </a:p>
+          <a:p>
+            <a:pPr marL="285750" indent="-285750">
+              <a:buFont typeface="Arial" panose="020B0604020202020204" pitchFamily="34" charset="0"/>
+              <a:buChar char="•"/>
+            </a:pPr>
+            <a:r>
+              <a:rPr lang="en-US" b="1" dirty="0"/>
+              <a:t>Async == Observable</a:t>
+            </a:r>
           </a:p>
         </p:txBody>
       </p:sp>
     </p:spTree>
     <p:extLst>
       <p:ext uri="{BB962C8B-B14F-4D97-AF65-F5344CB8AC3E}">
-        <p14:creationId xmlns:p14="http://schemas.microsoft.com/office/powerpoint/2010/main" val="619273034"/>
+        <p14:creationId xmlns:p14="http://schemas.microsoft.com/office/powerpoint/2010/main" val="468149894"/>
       </p:ext>
     </p:extLst>
   </p:cSld>
@@ -14500,8 +14640,8 @@
         </p:nvSpPr>
         <p:spPr>
           <a:xfrm>
-            <a:off x="1154955" y="1015741"/>
-            <a:ext cx="8825658" cy="813055"/>
+            <a:off x="1154955" y="776494"/>
+            <a:ext cx="8825658" cy="713639"/>
           </a:xfrm>
         </p:spPr>
         <p:txBody>
@@ -14509,10 +14649,10 @@
           <a:lstStyle/>
           <a:p>
             <a:r>
-              <a:rPr lang="en-US" dirty="0" err="1"/>
-              <a:t>xxxx</a:t>
+              <a:rPr lang="ru-RU" sz="4400" dirty="0"/>
+              <a:t>Откуда ноги ростут?</a:t>
             </a:r>
-            <a:endParaRPr lang="en-US" dirty="0"/>
+            <a:endParaRPr lang="en-US" sz="4400" dirty="0"/>
           </a:p>
         </p:txBody>
       </p:sp>
@@ -14532,15 +14672,16 @@
             <p:ph type="subTitle" idx="1"/>
           </p:nvPr>
         </p:nvSpPr>
-        <p:spPr/>
+        <p:spPr>
+          <a:xfrm>
+            <a:off x="1154955" y="2861733"/>
+            <a:ext cx="8825658" cy="2777067"/>
+          </a:xfrm>
+        </p:spPr>
         <p:txBody>
           <a:bodyPr/>
           <a:lstStyle/>
           <a:p>
-            <a:r>
-              <a:rPr lang="en-US" dirty="0" err="1"/>
-              <a:t>Xxxx</a:t>
-            </a:r>
             <a:endParaRPr lang="en-US" dirty="0"/>
           </a:p>
         </p:txBody>
@@ -14548,7 +14689,7 @@
     </p:spTree>
     <p:extLst>
       <p:ext uri="{BB962C8B-B14F-4D97-AF65-F5344CB8AC3E}">
-        <p14:creationId xmlns:p14="http://schemas.microsoft.com/office/powerpoint/2010/main" val="4246272405"/>
+        <p14:creationId xmlns:p14="http://schemas.microsoft.com/office/powerpoint/2010/main" val="685208879"/>
       </p:ext>
     </p:extLst>
   </p:cSld>
@@ -14593,8 +14734,8 @@
         </p:nvSpPr>
         <p:spPr>
           <a:xfrm>
-            <a:off x="1154955" y="1015741"/>
-            <a:ext cx="8825658" cy="813055"/>
+            <a:off x="1154955" y="776494"/>
+            <a:ext cx="8825658" cy="713639"/>
           </a:xfrm>
         </p:spPr>
         <p:txBody>
@@ -14602,10 +14743,10 @@
           <a:lstStyle/>
           <a:p>
             <a:r>
-              <a:rPr lang="en-US" dirty="0" err="1"/>
-              <a:t>xxxx</a:t>
+              <a:rPr lang="ru-RU" sz="4400" dirty="0"/>
+              <a:t>Откуда ноги ростут?</a:t>
             </a:r>
-            <a:endParaRPr lang="en-US" dirty="0"/>
+            <a:endParaRPr lang="en-US" sz="4400" dirty="0"/>
           </a:p>
         </p:txBody>
       </p:sp>
@@ -14625,15 +14766,26 @@
             <p:ph type="subTitle" idx="1"/>
           </p:nvPr>
         </p:nvSpPr>
-        <p:spPr/>
+        <p:spPr>
+          <a:xfrm>
+            <a:off x="1154955" y="2861733"/>
+            <a:ext cx="8825658" cy="2777067"/>
+          </a:xfrm>
+        </p:spPr>
         <p:txBody>
           <a:bodyPr/>
           <a:lstStyle/>
           <a:p>
             <a:r>
-              <a:rPr lang="en-US" dirty="0" err="1"/>
-              <a:t>Xxxx</a:t>
+              <a:rPr lang="ru-RU" dirty="0"/>
+              <a:t>От </a:t>
             </a:r>
+            <a:r>
+              <a:rPr lang="en-US" dirty="0"/>
+              <a:t>…</a:t>
+            </a:r>
+          </a:p>
+          <a:p>
             <a:endParaRPr lang="en-US" dirty="0"/>
           </a:p>
         </p:txBody>
@@ -14641,7 +14793,7 @@
     </p:spTree>
     <p:extLst>
       <p:ext uri="{BB962C8B-B14F-4D97-AF65-F5344CB8AC3E}">
-        <p14:creationId xmlns:p14="http://schemas.microsoft.com/office/powerpoint/2010/main" val="2771224777"/>
+        <p14:creationId xmlns:p14="http://schemas.microsoft.com/office/powerpoint/2010/main" val="3557030923"/>
       </p:ext>
     </p:extLst>
   </p:cSld>

</xml_diff>